<commit_message>
feat: Enhance ECMA-376 parser and viewer for improved section handling
- Updated section parsing logic to accurately capture and validate level 1 sections, ensuring only relevant headers are processed.
- Introduced mechanisms to avoid duplicate section entries and refined regex patterns for better accuracy.
- Adjusted the JSON output structure to reflect the correct hierarchy and depth of sections, reducing the total count from 1,575 to 602.
- Enhanced README documentation to reflect changes in section statistics and provide clearer usage instructions.
- Improved Next.js configuration to handle path issues and optimize development experience.

These enhancements significantly improve the accuracy and usability of the ECMA-376 documentation viewer, ensuring a more reliable and efficient user experience.
</commit_message>
<xml_diff>
--- a/generate-#19/output.pptx
+++ b/generate-#19/output.pptx
@@ -470,17 +470,21 @@
           <ns1:custGeom>
             <ns1:avLst/>
             <ns1:gdLst>
-              <ns1:gd name="w" fmla="*/ ss 1 1"/>
-              <ns1:gd name="h" fmla="*/ ss 1 1"/>
+              <ns1:gd name="w" fmla="*/ w 1 1"/>
+              <ns1:gd name="h" fmla="*/ h 1 1"/>
               <ns1:gd name="hc" fmla="*/ w 1 2"/>
               <ns1:gd name="vc" fmla="*/ h 1 2"/>
+              <ns1:gd name="r" fmla="*/ w 1 2"/>
             </ns1:gdLst>
             <ns1:pathLst>
               <ns1:path w="2000000" h="2000000">
                 <ns1:moveTo>
-                  <ns1:pt x="2000000" y="1000000"/>
+                  <ns1:pt x="1000000" y="0"/>
                 </ns1:moveTo>
-                <ns1:arcTo wR="1000000" hR="1000000" stAng="0" swAng="21600000"/>
+                <ns1:arcTo wR="1000000" hR="1000000" stAng="0" swAng="5400000"/>
+                <ns1:arcTo wR="1000000" hR="1000000" stAng="5400000" swAng="5400000"/>
+                <ns1:arcTo wR="1000000" hR="1000000" stAng="10800000" swAng="5400000"/>
+                <ns1:arcTo wR="1000000" hR="1000000" stAng="16200000" swAng="5400000"/>
                 <ns1:close/>
               </ns1:path>
             </ns1:pathLst>

</xml_diff>